<commit_message>
updated presentation 4 - vim
</commit_message>
<xml_diff>
--- a/MondayPresentations/4_vim/vim.pptx
+++ b/MondayPresentations/4_vim/vim.pptx
@@ -10709,7 +10709,7 @@
           <a:p>
             <a:fld id="{180F92CB-13D4-4592-BB5C-270494AF45EC}" type="datetimeFigureOut">
               <a:rPr lang="en-US" smtClean="0"/>
-              <a:t>6/24/2018</a:t>
+              <a:t>6/25/2018</a:t>
             </a:fld>
             <a:endParaRPr lang="en-US"/>
           </a:p>
@@ -12983,7 +12983,7 @@
           <a:p>
             <a:fld id="{D1F7049B-E801-40BF-A65E-24F16D469B74}" type="datetimeFigureOut">
               <a:rPr lang="en-US" smtClean="0"/>
-              <a:t>6/24/2018</a:t>
+              <a:t>6/25/2018</a:t>
             </a:fld>
             <a:endParaRPr lang="en-US"/>
           </a:p>
@@ -13181,7 +13181,7 @@
           <a:p>
             <a:fld id="{D1F7049B-E801-40BF-A65E-24F16D469B74}" type="datetimeFigureOut">
               <a:rPr lang="en-US" smtClean="0"/>
-              <a:t>6/24/2018</a:t>
+              <a:t>6/25/2018</a:t>
             </a:fld>
             <a:endParaRPr lang="en-US"/>
           </a:p>
@@ -13389,7 +13389,7 @@
           <a:p>
             <a:fld id="{D1F7049B-E801-40BF-A65E-24F16D469B74}" type="datetimeFigureOut">
               <a:rPr lang="en-US" smtClean="0"/>
-              <a:t>6/24/2018</a:t>
+              <a:t>6/25/2018</a:t>
             </a:fld>
             <a:endParaRPr lang="en-US"/>
           </a:p>
@@ -13587,7 +13587,7 @@
           <a:p>
             <a:fld id="{D1F7049B-E801-40BF-A65E-24F16D469B74}" type="datetimeFigureOut">
               <a:rPr lang="en-US" smtClean="0"/>
-              <a:t>6/24/2018</a:t>
+              <a:t>6/25/2018</a:t>
             </a:fld>
             <a:endParaRPr lang="en-US"/>
           </a:p>
@@ -13862,7 +13862,7 @@
           <a:p>
             <a:fld id="{D1F7049B-E801-40BF-A65E-24F16D469B74}" type="datetimeFigureOut">
               <a:rPr lang="en-US" smtClean="0"/>
-              <a:t>6/24/2018</a:t>
+              <a:t>6/25/2018</a:t>
             </a:fld>
             <a:endParaRPr lang="en-US"/>
           </a:p>
@@ -14127,7 +14127,7 @@
           <a:p>
             <a:fld id="{D1F7049B-E801-40BF-A65E-24F16D469B74}" type="datetimeFigureOut">
               <a:rPr lang="en-US" smtClean="0"/>
-              <a:t>6/24/2018</a:t>
+              <a:t>6/25/2018</a:t>
             </a:fld>
             <a:endParaRPr lang="en-US"/>
           </a:p>
@@ -14539,7 +14539,7 @@
           <a:p>
             <a:fld id="{D1F7049B-E801-40BF-A65E-24F16D469B74}" type="datetimeFigureOut">
               <a:rPr lang="en-US" smtClean="0"/>
-              <a:t>6/24/2018</a:t>
+              <a:t>6/25/2018</a:t>
             </a:fld>
             <a:endParaRPr lang="en-US"/>
           </a:p>
@@ -14680,7 +14680,7 @@
           <a:p>
             <a:fld id="{D1F7049B-E801-40BF-A65E-24F16D469B74}" type="datetimeFigureOut">
               <a:rPr lang="en-US" smtClean="0"/>
-              <a:t>6/24/2018</a:t>
+              <a:t>6/25/2018</a:t>
             </a:fld>
             <a:endParaRPr lang="en-US"/>
           </a:p>
@@ -14793,7 +14793,7 @@
           <a:p>
             <a:fld id="{D1F7049B-E801-40BF-A65E-24F16D469B74}" type="datetimeFigureOut">
               <a:rPr lang="en-US" smtClean="0"/>
-              <a:t>6/24/2018</a:t>
+              <a:t>6/25/2018</a:t>
             </a:fld>
             <a:endParaRPr lang="en-US"/>
           </a:p>
@@ -15104,7 +15104,7 @@
           <a:p>
             <a:fld id="{D1F7049B-E801-40BF-A65E-24F16D469B74}" type="datetimeFigureOut">
               <a:rPr lang="en-US" smtClean="0"/>
-              <a:t>6/24/2018</a:t>
+              <a:t>6/25/2018</a:t>
             </a:fld>
             <a:endParaRPr lang="en-US"/>
           </a:p>
@@ -15392,7 +15392,7 @@
           <a:p>
             <a:fld id="{D1F7049B-E801-40BF-A65E-24F16D469B74}" type="datetimeFigureOut">
               <a:rPr lang="en-US" smtClean="0"/>
-              <a:t>6/24/2018</a:t>
+              <a:t>6/25/2018</a:t>
             </a:fld>
             <a:endParaRPr lang="en-US"/>
           </a:p>
@@ -15633,7 +15633,7 @@
           <a:p>
             <a:fld id="{D1F7049B-E801-40BF-A65E-24F16D469B74}" type="datetimeFigureOut">
               <a:rPr lang="en-US" smtClean="0"/>
-              <a:t>6/24/2018</a:t>
+              <a:t>6/25/2018</a:t>
             </a:fld>
             <a:endParaRPr lang="en-US"/>
           </a:p>
@@ -18788,7 +18788,7 @@
             </a:pPr>
             <a:r>
               <a:rPr lang="en-US" sz="3200" dirty="0"/>
-              <a:t>(+ contributors)</a:t>
+              <a:t>(+ contributors) – Based on Stevie</a:t>
             </a:r>
           </a:p>
           <a:p>

</xml_diff>